<commit_message>
edits to job talk
</commit_message>
<xml_diff>
--- a/job/NCC/teaching/hypothesis-mean.pptx
+++ b/job/NCC/teaching/hypothesis-mean.pptx
@@ -5,7 +5,7 @@
     <p:sldMasterId id="2147483660" r:id="rId1"/>
   </p:sldMasterIdLst>
   <p:notesMasterIdLst>
-    <p:notesMasterId r:id="rId32"/>
+    <p:notesMasterId r:id="rId33"/>
   </p:notesMasterIdLst>
   <p:sldIdLst>
     <p:sldId id="288" r:id="rId2"/>
@@ -15,29 +15,30 @@
     <p:sldId id="377" r:id="rId6"/>
     <p:sldId id="258" r:id="rId7"/>
     <p:sldId id="372" r:id="rId8"/>
-    <p:sldId id="281" r:id="rId9"/>
+    <p:sldId id="333" r:id="rId9"/>
     <p:sldId id="378" r:id="rId10"/>
     <p:sldId id="379" r:id="rId11"/>
     <p:sldId id="317" r:id="rId12"/>
-    <p:sldId id="382" r:id="rId13"/>
-    <p:sldId id="380" r:id="rId14"/>
-    <p:sldId id="319" r:id="rId15"/>
-    <p:sldId id="381" r:id="rId16"/>
-    <p:sldId id="367" r:id="rId17"/>
-    <p:sldId id="368" r:id="rId18"/>
-    <p:sldId id="369" r:id="rId19"/>
-    <p:sldId id="374" r:id="rId20"/>
-    <p:sldId id="384" r:id="rId21"/>
-    <p:sldId id="298" r:id="rId22"/>
-    <p:sldId id="296" r:id="rId23"/>
-    <p:sldId id="301" r:id="rId24"/>
-    <p:sldId id="383" r:id="rId25"/>
-    <p:sldId id="371" r:id="rId26"/>
-    <p:sldId id="386" r:id="rId27"/>
-    <p:sldId id="387" r:id="rId28"/>
-    <p:sldId id="390" r:id="rId29"/>
-    <p:sldId id="391" r:id="rId30"/>
-    <p:sldId id="325" r:id="rId31"/>
+    <p:sldId id="281" r:id="rId13"/>
+    <p:sldId id="382" r:id="rId14"/>
+    <p:sldId id="380" r:id="rId15"/>
+    <p:sldId id="319" r:id="rId16"/>
+    <p:sldId id="381" r:id="rId17"/>
+    <p:sldId id="367" r:id="rId18"/>
+    <p:sldId id="368" r:id="rId19"/>
+    <p:sldId id="369" r:id="rId20"/>
+    <p:sldId id="374" r:id="rId21"/>
+    <p:sldId id="384" r:id="rId22"/>
+    <p:sldId id="298" r:id="rId23"/>
+    <p:sldId id="296" r:id="rId24"/>
+    <p:sldId id="301" r:id="rId25"/>
+    <p:sldId id="383" r:id="rId26"/>
+    <p:sldId id="371" r:id="rId27"/>
+    <p:sldId id="386" r:id="rId28"/>
+    <p:sldId id="387" r:id="rId29"/>
+    <p:sldId id="390" r:id="rId30"/>
+    <p:sldId id="391" r:id="rId31"/>
+    <p:sldId id="325" r:id="rId32"/>
   </p:sldIdLst>
   <p:sldSz cx="12192000" cy="6858000"/>
   <p:notesSz cx="6858000" cy="9144000"/>
@@ -147,7 +148,7 @@
 <file path=ppt/revisionInfo.xml><?xml version="1.0" encoding="utf-8"?>
 <p1510:revInfo xmlns:a="http://schemas.openxmlformats.org/drawingml/2006/main" xmlns:r="http://schemas.openxmlformats.org/officeDocument/2006/relationships" xmlns:p1510="http://schemas.microsoft.com/office/powerpoint/2015/10/main">
   <p1510:revLst>
-    <p1510:client id="{32569737-0535-45EB-8B0A-71C73B93E28D}" v="29" dt="2022-12-07T23:21:56.605"/>
+    <p1510:client id="{32569737-0535-45EB-8B0A-71C73B93E28D}" v="36" dt="2022-12-08T16:49:12.176"/>
   </p1510:revLst>
 </p1510:revInfo>
 </file>
@@ -233,11 +234,48 @@
   </pc:docChgLst>
   <pc:docChgLst>
     <pc:chgData name="Alison Kleffner" userId="0bed3509-e787-48f4-9a13-47afcd2529d5" providerId="ADAL" clId="{32569737-0535-45EB-8B0A-71C73B93E28D}"/>
-    <pc:docChg chg="undo custSel addSld modSld">
-      <pc:chgData name="Alison Kleffner" userId="0bed3509-e787-48f4-9a13-47afcd2529d5" providerId="ADAL" clId="{32569737-0535-45EB-8B0A-71C73B93E28D}" dt="2022-12-07T23:21:56.605" v="572"/>
+    <pc:docChg chg="undo custSel addSld modSld sldOrd">
+      <pc:chgData name="Alison Kleffner" userId="0bed3509-e787-48f4-9a13-47afcd2529d5" providerId="ADAL" clId="{32569737-0535-45EB-8B0A-71C73B93E28D}" dt="2022-12-08T16:50:03.093" v="668"/>
       <pc:docMkLst>
         <pc:docMk/>
       </pc:docMkLst>
+      <pc:sldChg chg="modSp mod">
+        <pc:chgData name="Alison Kleffner" userId="0bed3509-e787-48f4-9a13-47afcd2529d5" providerId="ADAL" clId="{32569737-0535-45EB-8B0A-71C73B93E28D}" dt="2022-12-08T16:41:25.687" v="596" actId="27636"/>
+        <pc:sldMkLst>
+          <pc:docMk/>
+          <pc:sldMk cId="4019713204" sldId="258"/>
+        </pc:sldMkLst>
+        <pc:spChg chg="mod">
+          <ac:chgData name="Alison Kleffner" userId="0bed3509-e787-48f4-9a13-47afcd2529d5" providerId="ADAL" clId="{32569737-0535-45EB-8B0A-71C73B93E28D}" dt="2022-12-08T16:41:25.687" v="596" actId="27636"/>
+          <ac:spMkLst>
+            <pc:docMk/>
+            <pc:sldMk cId="4019713204" sldId="258"/>
+            <ac:spMk id="3" creationId="{00000000-0000-0000-0000-000000000000}"/>
+          </ac:spMkLst>
+        </pc:spChg>
+      </pc:sldChg>
+      <pc:sldChg chg="ord">
+        <pc:chgData name="Alison Kleffner" userId="0bed3509-e787-48f4-9a13-47afcd2529d5" providerId="ADAL" clId="{32569737-0535-45EB-8B0A-71C73B93E28D}" dt="2022-12-08T16:50:03.093" v="668"/>
+        <pc:sldMkLst>
+          <pc:docMk/>
+          <pc:sldMk cId="1989967379" sldId="281"/>
+        </pc:sldMkLst>
+      </pc:sldChg>
+      <pc:sldChg chg="modSp">
+        <pc:chgData name="Alison Kleffner" userId="0bed3509-e787-48f4-9a13-47afcd2529d5" providerId="ADAL" clId="{32569737-0535-45EB-8B0A-71C73B93E28D}" dt="2022-12-08T16:49:12.176" v="664" actId="20577"/>
+        <pc:sldMkLst>
+          <pc:docMk/>
+          <pc:sldMk cId="1453628969" sldId="317"/>
+        </pc:sldMkLst>
+        <pc:spChg chg="mod">
+          <ac:chgData name="Alison Kleffner" userId="0bed3509-e787-48f4-9a13-47afcd2529d5" providerId="ADAL" clId="{32569737-0535-45EB-8B0A-71C73B93E28D}" dt="2022-12-08T16:49:12.176" v="664" actId="20577"/>
+          <ac:spMkLst>
+            <pc:docMk/>
+            <pc:sldMk cId="1453628969" sldId="317"/>
+            <ac:spMk id="3" creationId="{00000000-0000-0000-0000-000000000000}"/>
+          </ac:spMkLst>
+        </pc:spChg>
+      </pc:sldChg>
       <pc:sldChg chg="delSp mod">
         <pc:chgData name="Alison Kleffner" userId="0bed3509-e787-48f4-9a13-47afcd2529d5" providerId="ADAL" clId="{32569737-0535-45EB-8B0A-71C73B93E28D}" dt="2022-12-07T03:44:35.399" v="15" actId="478"/>
         <pc:sldMkLst>
@@ -250,6 +288,29 @@
             <pc:docMk/>
             <pc:sldMk cId="3587817226" sldId="325"/>
             <ac:spMk id="4" creationId="{F66C3769-D007-4DF1-BA72-5F9027772A4F}"/>
+          </ac:spMkLst>
+        </pc:spChg>
+      </pc:sldChg>
+      <pc:sldChg chg="modSp add mod ord">
+        <pc:chgData name="Alison Kleffner" userId="0bed3509-e787-48f4-9a13-47afcd2529d5" providerId="ADAL" clId="{32569737-0535-45EB-8B0A-71C73B93E28D}" dt="2022-12-08T16:42:20.099" v="658" actId="14100"/>
+        <pc:sldMkLst>
+          <pc:docMk/>
+          <pc:sldMk cId="118155561" sldId="333"/>
+        </pc:sldMkLst>
+        <pc:spChg chg="mod">
+          <ac:chgData name="Alison Kleffner" userId="0bed3509-e787-48f4-9a13-47afcd2529d5" providerId="ADAL" clId="{32569737-0535-45EB-8B0A-71C73B93E28D}" dt="2022-12-08T16:41:16.138" v="594" actId="20577"/>
+          <ac:spMkLst>
+            <pc:docMk/>
+            <pc:sldMk cId="118155561" sldId="333"/>
+            <ac:spMk id="2" creationId="{00000000-0000-0000-0000-000000000000}"/>
+          </ac:spMkLst>
+        </pc:spChg>
+        <pc:spChg chg="mod">
+          <ac:chgData name="Alison Kleffner" userId="0bed3509-e787-48f4-9a13-47afcd2529d5" providerId="ADAL" clId="{32569737-0535-45EB-8B0A-71C73B93E28D}" dt="2022-12-08T16:42:20.099" v="658" actId="14100"/>
+          <ac:spMkLst>
+            <pc:docMk/>
+            <pc:sldMk cId="118155561" sldId="333"/>
+            <ac:spMk id="3" creationId="{00000000-0000-0000-0000-000000000000}"/>
           </ac:spMkLst>
         </pc:spChg>
       </pc:sldChg>
@@ -274,6 +335,36 @@
           <pc:docMk/>
           <pc:sldMk cId="2511387326" sldId="368"/>
         </pc:sldMkLst>
+      </pc:sldChg>
+      <pc:sldChg chg="modSp">
+        <pc:chgData name="Alison Kleffner" userId="0bed3509-e787-48f4-9a13-47afcd2529d5" providerId="ADAL" clId="{32569737-0535-45EB-8B0A-71C73B93E28D}" dt="2022-12-08T16:42:45.367" v="660" actId="20577"/>
+        <pc:sldMkLst>
+          <pc:docMk/>
+          <pc:sldMk cId="1479313812" sldId="378"/>
+        </pc:sldMkLst>
+        <pc:spChg chg="mod">
+          <ac:chgData name="Alison Kleffner" userId="0bed3509-e787-48f4-9a13-47afcd2529d5" providerId="ADAL" clId="{32569737-0535-45EB-8B0A-71C73B93E28D}" dt="2022-12-08T16:42:45.367" v="660" actId="20577"/>
+          <ac:spMkLst>
+            <pc:docMk/>
+            <pc:sldMk cId="1479313812" sldId="378"/>
+            <ac:spMk id="3" creationId="{62CEA698-E48B-A74F-77AD-E08537936486}"/>
+          </ac:spMkLst>
+        </pc:spChg>
+      </pc:sldChg>
+      <pc:sldChg chg="modSp">
+        <pc:chgData name="Alison Kleffner" userId="0bed3509-e787-48f4-9a13-47afcd2529d5" providerId="ADAL" clId="{32569737-0535-45EB-8B0A-71C73B93E28D}" dt="2022-12-08T16:42:51.737" v="662" actId="20577"/>
+        <pc:sldMkLst>
+          <pc:docMk/>
+          <pc:sldMk cId="702343086" sldId="379"/>
+        </pc:sldMkLst>
+        <pc:spChg chg="mod">
+          <ac:chgData name="Alison Kleffner" userId="0bed3509-e787-48f4-9a13-47afcd2529d5" providerId="ADAL" clId="{32569737-0535-45EB-8B0A-71C73B93E28D}" dt="2022-12-08T16:42:51.737" v="662" actId="20577"/>
+          <ac:spMkLst>
+            <pc:docMk/>
+            <pc:sldMk cId="702343086" sldId="379"/>
+            <ac:spMk id="3" creationId="{4196765B-66A1-F51F-AFA9-C4F0116EC4D8}"/>
+          </ac:spMkLst>
+        </pc:spChg>
       </pc:sldChg>
       <pc:sldChg chg="modSp mod">
         <pc:chgData name="Alison Kleffner" userId="0bed3509-e787-48f4-9a13-47afcd2529d5" providerId="ADAL" clId="{32569737-0535-45EB-8B0A-71C73B93E28D}" dt="2022-12-07T03:43:03.910" v="2" actId="255"/>
@@ -978,7 +1069,7 @@
           <a:p>
             <a:fld id="{1755E60A-BC6E-4DCB-AA5D-B1F1E8C97303}" type="datetimeFigureOut">
               <a:rPr lang="en-US" smtClean="0"/>
-              <a:t>12/7/2022</a:t>
+              <a:t>12/8/2022</a:t>
             </a:fld>
             <a:endParaRPr lang="en-US"/>
           </a:p>
@@ -1478,7 +1569,7 @@
           <a:p>
             <a:fld id="{BEEDAFEA-F454-4D1D-BC30-3A83F5827663}" type="slidenum">
               <a:rPr lang="en-US" smtClean="0"/>
-              <a:t>8</a:t>
+              <a:t>11</a:t>
             </a:fld>
             <a:endParaRPr lang="en-US"/>
           </a:p>
@@ -1487,7 +1578,7 @@
     </p:spTree>
     <p:extLst>
       <p:ext uri="{BB962C8B-B14F-4D97-AF65-F5344CB8AC3E}">
-        <p14:creationId xmlns:p14="http://schemas.microsoft.com/office/powerpoint/2010/main" val="1359252920"/>
+        <p14:creationId xmlns:p14="http://schemas.microsoft.com/office/powerpoint/2010/main" val="659745910"/>
       </p:ext>
     </p:extLst>
   </p:cSld>
@@ -1562,7 +1653,7 @@
           <a:p>
             <a:fld id="{BEEDAFEA-F454-4D1D-BC30-3A83F5827663}" type="slidenum">
               <a:rPr lang="en-US" smtClean="0"/>
-              <a:t>11</a:t>
+              <a:t>12</a:t>
             </a:fld>
             <a:endParaRPr lang="en-US"/>
           </a:p>
@@ -1571,7 +1662,7 @@
     </p:spTree>
     <p:extLst>
       <p:ext uri="{BB962C8B-B14F-4D97-AF65-F5344CB8AC3E}">
-        <p14:creationId xmlns:p14="http://schemas.microsoft.com/office/powerpoint/2010/main" val="659745910"/>
+        <p14:creationId xmlns:p14="http://schemas.microsoft.com/office/powerpoint/2010/main" val="1359252920"/>
       </p:ext>
     </p:extLst>
   </p:cSld>
@@ -1646,7 +1737,7 @@
           <a:p>
             <a:fld id="{BEEDAFEA-F454-4D1D-BC30-3A83F5827663}" type="slidenum">
               <a:rPr lang="en-US" smtClean="0"/>
-              <a:t>14</a:t>
+              <a:t>15</a:t>
             </a:fld>
             <a:endParaRPr lang="en-US"/>
           </a:p>
@@ -1730,7 +1821,7 @@
           <a:p>
             <a:fld id="{CC3BB620-159C-40C5-83AE-DFAA56FFA84B}" type="slidenum">
               <a:rPr lang="en-US" smtClean="0"/>
-              <a:t>21</a:t>
+              <a:t>22</a:t>
             </a:fld>
             <a:endParaRPr lang="en-US"/>
           </a:p>
@@ -2152,7 +2243,7 @@
           <a:p>
             <a:fld id="{B93AF512-2F4F-47B1-9BE4-4745C5848174}" type="datetimeFigureOut">
               <a:rPr lang="en-US" smtClean="0"/>
-              <a:t>12/7/2022</a:t>
+              <a:t>12/8/2022</a:t>
             </a:fld>
             <a:endParaRPr lang="en-US"/>
           </a:p>
@@ -2331,7 +2422,7 @@
           <a:p>
             <a:fld id="{B93AF512-2F4F-47B1-9BE4-4745C5848174}" type="datetimeFigureOut">
               <a:rPr lang="en-US" smtClean="0"/>
-              <a:t>12/7/2022</a:t>
+              <a:t>12/8/2022</a:t>
             </a:fld>
             <a:endParaRPr lang="en-US"/>
           </a:p>
@@ -2511,7 +2602,7 @@
           <a:p>
             <a:fld id="{B93AF512-2F4F-47B1-9BE4-4745C5848174}" type="datetimeFigureOut">
               <a:rPr lang="en-US" smtClean="0"/>
-              <a:t>12/7/2022</a:t>
+              <a:t>12/8/2022</a:t>
             </a:fld>
             <a:endParaRPr lang="en-US"/>
           </a:p>
@@ -2681,7 +2772,7 @@
           <a:p>
             <a:fld id="{B93AF512-2F4F-47B1-9BE4-4745C5848174}" type="datetimeFigureOut">
               <a:rPr lang="en-US" smtClean="0"/>
-              <a:t>12/7/2022</a:t>
+              <a:t>12/8/2022</a:t>
             </a:fld>
             <a:endParaRPr lang="en-US"/>
           </a:p>
@@ -2994,7 +3085,7 @@
           <a:p>
             <a:fld id="{B93AF512-2F4F-47B1-9BE4-4745C5848174}" type="datetimeFigureOut">
               <a:rPr lang="en-US" smtClean="0"/>
-              <a:t>12/7/2022</a:t>
+              <a:t>12/8/2022</a:t>
             </a:fld>
             <a:endParaRPr lang="en-US"/>
           </a:p>
@@ -3380,7 +3471,7 @@
           <a:p>
             <a:fld id="{B93AF512-2F4F-47B1-9BE4-4745C5848174}" type="datetimeFigureOut">
               <a:rPr lang="en-US" smtClean="0"/>
-              <a:t>12/7/2022</a:t>
+              <a:t>12/8/2022</a:t>
             </a:fld>
             <a:endParaRPr lang="en-US"/>
           </a:p>
@@ -3814,7 +3905,7 @@
           <a:p>
             <a:fld id="{B93AF512-2F4F-47B1-9BE4-4745C5848174}" type="datetimeFigureOut">
               <a:rPr lang="en-US" smtClean="0"/>
-              <a:t>12/7/2022</a:t>
+              <a:t>12/8/2022</a:t>
             </a:fld>
             <a:endParaRPr lang="en-US"/>
           </a:p>
@@ -3932,7 +4023,7 @@
           <a:p>
             <a:fld id="{B93AF512-2F4F-47B1-9BE4-4745C5848174}" type="datetimeFigureOut">
               <a:rPr lang="en-US" smtClean="0"/>
-              <a:t>12/7/2022</a:t>
+              <a:t>12/8/2022</a:t>
             </a:fld>
             <a:endParaRPr lang="en-US"/>
           </a:p>
@@ -4027,7 +4118,7 @@
           <a:p>
             <a:fld id="{B93AF512-2F4F-47B1-9BE4-4745C5848174}" type="datetimeFigureOut">
               <a:rPr lang="en-US" smtClean="0"/>
-              <a:t>12/7/2022</a:t>
+              <a:t>12/8/2022</a:t>
             </a:fld>
             <a:endParaRPr lang="en-US"/>
           </a:p>
@@ -4377,7 +4468,7 @@
           <a:p>
             <a:fld id="{B93AF512-2F4F-47B1-9BE4-4745C5848174}" type="datetimeFigureOut">
               <a:rPr lang="en-US" smtClean="0"/>
-              <a:t>12/7/2022</a:t>
+              <a:t>12/8/2022</a:t>
             </a:fld>
             <a:endParaRPr lang="en-US"/>
           </a:p>
@@ -4802,7 +4893,7 @@
           <a:p>
             <a:fld id="{B93AF512-2F4F-47B1-9BE4-4745C5848174}" type="datetimeFigureOut">
               <a:rPr lang="en-US" smtClean="0"/>
-              <a:t>12/7/2022</a:t>
+              <a:t>12/8/2022</a:t>
             </a:fld>
             <a:endParaRPr lang="en-US"/>
           </a:p>
@@ -5083,7 +5174,7 @@
           <a:p>
             <a:fld id="{B93AF512-2F4F-47B1-9BE4-4745C5848174}" type="datetimeFigureOut">
               <a:rPr lang="en-US" smtClean="0"/>
-              <a:t>12/7/2022</a:t>
+              <a:t>12/8/2022</a:t>
             </a:fld>
             <a:endParaRPr lang="en-US"/>
           </a:p>
@@ -5981,7 +6072,7 @@
                   </a:schemeClr>
                 </a:solidFill>
               </a:rPr>
-              <a:t>True average number of hours a college student sleeps a night</a:t>
+              <a:t>(True) average number of hours a college student sleeps a night</a:t>
             </a:r>
           </a:p>
           <a:p>
@@ -6423,8 +6514,8 @@
           </a:p>
         </p:txBody>
       </p:sp>
-      <mc:AlternateContent xmlns:mc="http://schemas.openxmlformats.org/markup-compatibility/2006" xmlns:a14="http://schemas.microsoft.com/office/drawing/2010/main">
-        <mc:Choice Requires="a14">
+      <mc:AlternateContent xmlns:mc="http://schemas.openxmlformats.org/markup-compatibility/2006">
+        <mc:Choice xmlns:a14="http://schemas.microsoft.com/office/drawing/2010/main" Requires="a14">
           <p:sp>
             <p:nvSpPr>
               <p:cNvPr id="3" name="Content Placeholder 2"/>
@@ -6648,7 +6739,7 @@
                       </a:schemeClr>
                     </a:solidFill>
                   </a:rPr>
-                  <a:t>) – The long run average price of an avocado in 2017.</a:t>
+                  <a:t>) – The (long run) average price of an avocado in 2017.</a:t>
                 </a:r>
               </a:p>
               <a:p>
@@ -6787,7 +6878,7 @@
             </p:txBody>
           </p:sp>
         </mc:Choice>
-        <mc:Fallback xmlns="">
+        <mc:Fallback>
           <p:sp>
             <p:nvSpPr>
               <p:cNvPr id="3" name="Content Placeholder 2"/>
@@ -7011,6 +7102,177 @@
 </file>
 
 <file path=ppt/slides/slide12.xml><?xml version="1.0" encoding="utf-8"?>
+<p:sld xmlns:a="http://schemas.openxmlformats.org/drawingml/2006/main" xmlns:r="http://schemas.openxmlformats.org/officeDocument/2006/relationships" xmlns:p="http://schemas.openxmlformats.org/presentationml/2006/main">
+  <p:cSld>
+    <p:spTree>
+      <p:nvGrpSpPr>
+        <p:cNvPr id="1" name=""/>
+        <p:cNvGrpSpPr/>
+        <p:nvPr/>
+      </p:nvGrpSpPr>
+      <p:grpSpPr>
+        <a:xfrm>
+          <a:off x="0" y="0"/>
+          <a:ext cx="0" cy="0"/>
+          <a:chOff x="0" y="0"/>
+          <a:chExt cx="0" cy="0"/>
+        </a:xfrm>
+      </p:grpSpPr>
+      <p:sp>
+        <p:nvSpPr>
+          <p:cNvPr id="2" name="Title 1"/>
+          <p:cNvSpPr>
+            <a:spLocks noGrp="1"/>
+          </p:cNvSpPr>
+          <p:nvPr>
+            <p:ph type="title"/>
+          </p:nvPr>
+        </p:nvSpPr>
+        <p:spPr>
+          <a:xfrm>
+            <a:off x="1069848" y="355323"/>
+            <a:ext cx="10058400" cy="983950"/>
+          </a:xfrm>
+        </p:spPr>
+        <p:txBody>
+          <a:bodyPr>
+            <a:normAutofit/>
+          </a:bodyPr>
+          <a:lstStyle/>
+          <a:p>
+            <a:r>
+              <a:rPr lang="en-US" sz="4800" dirty="0"/>
+              <a:t>Statistical Significance</a:t>
+            </a:r>
+          </a:p>
+        </p:txBody>
+      </p:sp>
+      <p:sp>
+        <p:nvSpPr>
+          <p:cNvPr id="3" name="Content Placeholder 2"/>
+          <p:cNvSpPr>
+            <a:spLocks noGrp="1"/>
+          </p:cNvSpPr>
+          <p:nvPr>
+            <p:ph idx="1"/>
+          </p:nvPr>
+        </p:nvSpPr>
+        <p:spPr>
+          <a:xfrm>
+            <a:off x="1069848" y="1505528"/>
+            <a:ext cx="10058400" cy="5054600"/>
+          </a:xfrm>
+        </p:spPr>
+        <p:txBody>
+          <a:bodyPr>
+            <a:normAutofit/>
+          </a:bodyPr>
+          <a:lstStyle/>
+          <a:p>
+            <a:r>
+              <a:rPr lang="en-US" b="1" dirty="0">
+                <a:solidFill>
+                  <a:schemeClr val="accent1">
+                    <a:lumMod val="75000"/>
+                  </a:schemeClr>
+                </a:solidFill>
+              </a:rPr>
+              <a:t>Statistics</a:t>
+            </a:r>
+            <a:r>
+              <a:rPr lang="en-US" dirty="0"/>
+              <a:t> – Estimate broad populations</a:t>
+            </a:r>
+          </a:p>
+          <a:p>
+            <a:pPr lvl="1"/>
+            <a:r>
+              <a:rPr lang="en-US" dirty="0"/>
+              <a:t>No way to collect all information</a:t>
+            </a:r>
+          </a:p>
+          <a:p>
+            <a:pPr lvl="1"/>
+            <a:r>
+              <a:rPr lang="en-US" dirty="0"/>
+              <a:t>Want to know when is a sample Statistically Significant?</a:t>
+            </a:r>
+          </a:p>
+          <a:p>
+            <a:pPr marL="0" indent="0">
+              <a:buNone/>
+            </a:pPr>
+            <a:endParaRPr lang="en-US" b="1" dirty="0">
+              <a:solidFill>
+                <a:srgbClr val="7030A0"/>
+              </a:solidFill>
+            </a:endParaRPr>
+          </a:p>
+          <a:p>
+            <a:pPr marL="0" indent="0">
+              <a:buNone/>
+            </a:pPr>
+            <a:r>
+              <a:rPr lang="en-US" b="1" dirty="0">
+                <a:solidFill>
+                  <a:schemeClr val="accent1">
+                    <a:lumMod val="75000"/>
+                  </a:schemeClr>
+                </a:solidFill>
+              </a:rPr>
+              <a:t>So What is Statistical Significance?</a:t>
+            </a:r>
+          </a:p>
+          <a:p>
+            <a:pPr lvl="1"/>
+            <a:r>
+              <a:rPr lang="en-US" dirty="0"/>
+              <a:t>Asking ourselves: “Is our result unlikely to have occurred by </a:t>
+            </a:r>
+            <a:r>
+              <a:rPr lang="en-US" i="1" dirty="0"/>
+              <a:t>random chance?”</a:t>
+            </a:r>
+          </a:p>
+          <a:p>
+            <a:pPr lvl="1"/>
+            <a:endParaRPr lang="en-US" dirty="0"/>
+          </a:p>
+          <a:p>
+            <a:pPr marL="0" indent="0">
+              <a:buNone/>
+            </a:pPr>
+            <a:r>
+              <a:rPr lang="en-US" dirty="0"/>
+              <a:t>How do we determine this? </a:t>
+            </a:r>
+            <a:r>
+              <a:rPr lang="en-US" dirty="0">
+                <a:solidFill>
+                  <a:schemeClr val="accent1">
+                    <a:lumMod val="75000"/>
+                  </a:schemeClr>
+                </a:solidFill>
+              </a:rPr>
+              <a:t>Hypothesis Testing</a:t>
+            </a:r>
+          </a:p>
+        </p:txBody>
+      </p:sp>
+    </p:spTree>
+    <p:extLst>
+      <p:ext uri="{BB962C8B-B14F-4D97-AF65-F5344CB8AC3E}">
+        <p14:creationId xmlns:p14="http://schemas.microsoft.com/office/powerpoint/2010/main" val="1989967379"/>
+      </p:ext>
+    </p:extLst>
+  </p:cSld>
+  <p:clrMapOvr>
+    <a:masterClrMapping/>
+  </p:clrMapOvr>
+</p:sld>
+</file>
+
+<file path=ppt/slides/slide13.xml><?xml version="1.0" encoding="utf-8"?>
 <p:sld xmlns:a="http://schemas.openxmlformats.org/drawingml/2006/main" xmlns:r="http://schemas.openxmlformats.org/officeDocument/2006/relationships" xmlns:p="http://schemas.openxmlformats.org/presentationml/2006/main">
   <p:cSld>
     <p:bg>
@@ -7562,7 +7824,7 @@
 </p:sld>
 </file>
 
-<file path=ppt/slides/slide13.xml><?xml version="1.0" encoding="utf-8"?>
+<file path=ppt/slides/slide14.xml><?xml version="1.0" encoding="utf-8"?>
 <p:sld xmlns:a="http://schemas.openxmlformats.org/drawingml/2006/main" xmlns:r="http://schemas.openxmlformats.org/officeDocument/2006/relationships" xmlns:p="http://schemas.openxmlformats.org/presentationml/2006/main">
   <p:cSld>
     <p:spTree>
@@ -7818,7 +8080,7 @@
 </p:sld>
 </file>
 
-<file path=ppt/slides/slide14.xml><?xml version="1.0" encoding="utf-8"?>
+<file path=ppt/slides/slide15.xml><?xml version="1.0" encoding="utf-8"?>
 <p:sld xmlns:a="http://schemas.openxmlformats.org/drawingml/2006/main" xmlns:r="http://schemas.openxmlformats.org/officeDocument/2006/relationships" xmlns:p="http://schemas.openxmlformats.org/presentationml/2006/main">
   <p:cSld>
     <p:spTree>
@@ -8647,7 +8909,7 @@
 </p:sld>
 </file>
 
-<file path=ppt/slides/slide15.xml><?xml version="1.0" encoding="utf-8"?>
+<file path=ppt/slides/slide16.xml><?xml version="1.0" encoding="utf-8"?>
 <p:sld xmlns:a="http://schemas.openxmlformats.org/drawingml/2006/main" xmlns:r="http://schemas.openxmlformats.org/officeDocument/2006/relationships" xmlns:p="http://schemas.openxmlformats.org/presentationml/2006/main">
   <p:cSld>
     <p:spTree>
@@ -9087,7 +9349,7 @@
 </p:sld>
 </file>
 
-<file path=ppt/slides/slide16.xml><?xml version="1.0" encoding="utf-8"?>
+<file path=ppt/slides/slide17.xml><?xml version="1.0" encoding="utf-8"?>
 <p:sld xmlns:a="http://schemas.openxmlformats.org/drawingml/2006/main" xmlns:r="http://schemas.openxmlformats.org/officeDocument/2006/relationships" xmlns:p="http://schemas.openxmlformats.org/presentationml/2006/main">
   <p:cSld>
     <p:spTree>
@@ -9211,7 +9473,7 @@
 </p:sld>
 </file>
 
-<file path=ppt/slides/slide17.xml><?xml version="1.0" encoding="utf-8"?>
+<file path=ppt/slides/slide18.xml><?xml version="1.0" encoding="utf-8"?>
 <p:sld xmlns:a="http://schemas.openxmlformats.org/drawingml/2006/main" xmlns:r="http://schemas.openxmlformats.org/officeDocument/2006/relationships" xmlns:p="http://schemas.openxmlformats.org/presentationml/2006/main">
   <p:cSld>
     <p:spTree>
@@ -9863,7 +10125,7 @@
 </p:sld>
 </file>
 
-<file path=ppt/slides/slide18.xml><?xml version="1.0" encoding="utf-8"?>
+<file path=ppt/slides/slide19.xml><?xml version="1.0" encoding="utf-8"?>
 <p:sld xmlns:a="http://schemas.openxmlformats.org/drawingml/2006/main" xmlns:r="http://schemas.openxmlformats.org/officeDocument/2006/relationships" xmlns:p="http://schemas.openxmlformats.org/presentationml/2006/main">
   <p:cSld>
     <p:spTree>
@@ -10500,7 +10762,139 @@
 </p:sld>
 </file>
 
-<file path=ppt/slides/slide19.xml><?xml version="1.0" encoding="utf-8"?>
+<file path=ppt/slides/slide2.xml><?xml version="1.0" encoding="utf-8"?>
+<p:sld xmlns:a="http://schemas.openxmlformats.org/drawingml/2006/main" xmlns:r="http://schemas.openxmlformats.org/officeDocument/2006/relationships" xmlns:p="http://schemas.openxmlformats.org/presentationml/2006/main">
+  <p:cSld>
+    <p:spTree>
+      <p:nvGrpSpPr>
+        <p:cNvPr id="1" name=""/>
+        <p:cNvGrpSpPr/>
+        <p:nvPr/>
+      </p:nvGrpSpPr>
+      <p:grpSpPr>
+        <a:xfrm>
+          <a:off x="0" y="0"/>
+          <a:ext cx="0" cy="0"/>
+          <a:chOff x="0" y="0"/>
+          <a:chExt cx="0" cy="0"/>
+        </a:xfrm>
+      </p:grpSpPr>
+      <p:sp>
+        <p:nvSpPr>
+          <p:cNvPr id="2" name="Title 1">
+            <a:extLst>
+              <a:ext uri="{FF2B5EF4-FFF2-40B4-BE49-F238E27FC236}">
+                <a16:creationId xmlns:a16="http://schemas.microsoft.com/office/drawing/2014/main" id="{870C1474-CEC1-855A-A711-24F4368160B9}"/>
+              </a:ext>
+            </a:extLst>
+          </p:cNvPr>
+          <p:cNvSpPr>
+            <a:spLocks noGrp="1"/>
+          </p:cNvSpPr>
+          <p:nvPr>
+            <p:ph type="title"/>
+          </p:nvPr>
+        </p:nvSpPr>
+        <p:spPr/>
+        <p:txBody>
+          <a:bodyPr/>
+          <a:lstStyle/>
+          <a:p>
+            <a:r>
+              <a:rPr lang="en-US" dirty="0"/>
+              <a:t>schedule</a:t>
+            </a:r>
+          </a:p>
+        </p:txBody>
+      </p:sp>
+      <p:sp>
+        <p:nvSpPr>
+          <p:cNvPr id="3" name="Content Placeholder 2">
+            <a:extLst>
+              <a:ext uri="{FF2B5EF4-FFF2-40B4-BE49-F238E27FC236}">
+                <a16:creationId xmlns:a16="http://schemas.microsoft.com/office/drawing/2014/main" id="{18A99213-C03D-FE03-44ED-C56E6416DECF}"/>
+              </a:ext>
+            </a:extLst>
+          </p:cNvPr>
+          <p:cNvSpPr>
+            <a:spLocks noGrp="1"/>
+          </p:cNvSpPr>
+          <p:nvPr>
+            <p:ph idx="1"/>
+          </p:nvPr>
+        </p:nvSpPr>
+        <p:spPr/>
+        <p:txBody>
+          <a:bodyPr/>
+          <a:lstStyle/>
+          <a:p>
+            <a:pPr marL="457200" indent="-457200">
+              <a:buFont typeface="+mj-lt"/>
+              <a:buAutoNum type="arabicPeriod"/>
+            </a:pPr>
+            <a:r>
+              <a:rPr lang="en-US" dirty="0"/>
+              <a:t>Basic Definitions</a:t>
+            </a:r>
+          </a:p>
+          <a:p>
+            <a:pPr lvl="1"/>
+            <a:r>
+              <a:rPr lang="en-US" dirty="0"/>
+              <a:t>Population (Parameter) vs. Sample (Statistics)</a:t>
+            </a:r>
+          </a:p>
+          <a:p>
+            <a:pPr marL="457200" indent="-457200">
+              <a:buFont typeface="+mj-lt"/>
+              <a:buAutoNum type="arabicPeriod"/>
+            </a:pPr>
+            <a:r>
+              <a:rPr lang="en-US" dirty="0"/>
+              <a:t>Hypothesis Testing for a Single Mean</a:t>
+            </a:r>
+          </a:p>
+          <a:p>
+            <a:pPr lvl="1"/>
+            <a:r>
+              <a:rPr lang="en-US" dirty="0"/>
+              <a:t>Setting up hypothesis</a:t>
+            </a:r>
+          </a:p>
+          <a:p>
+            <a:pPr lvl="1"/>
+            <a:r>
+              <a:rPr lang="en-US" dirty="0"/>
+              <a:t>Conditions</a:t>
+            </a:r>
+          </a:p>
+          <a:p>
+            <a:pPr lvl="1"/>
+            <a:r>
+              <a:rPr lang="en-US" dirty="0"/>
+              <a:t>Finding Standardized Statistics and Drawing Conclusion</a:t>
+            </a:r>
+          </a:p>
+          <a:p>
+            <a:pPr lvl="1"/>
+            <a:endParaRPr lang="en-US" dirty="0"/>
+          </a:p>
+        </p:txBody>
+      </p:sp>
+    </p:spTree>
+    <p:extLst>
+      <p:ext uri="{BB962C8B-B14F-4D97-AF65-F5344CB8AC3E}">
+        <p14:creationId xmlns:p14="http://schemas.microsoft.com/office/powerpoint/2010/main" val="3554969862"/>
+      </p:ext>
+    </p:extLst>
+  </p:cSld>
+  <p:clrMapOvr>
+    <a:masterClrMapping/>
+  </p:clrMapOvr>
+</p:sld>
+</file>
+
+<file path=ppt/slides/slide20.xml><?xml version="1.0" encoding="utf-8"?>
 <p:sld xmlns:a="http://schemas.openxmlformats.org/drawingml/2006/main" xmlns:r="http://schemas.openxmlformats.org/officeDocument/2006/relationships" xmlns:p="http://schemas.openxmlformats.org/presentationml/2006/main">
   <p:cSld>
     <p:spTree>
@@ -10700,139 +11094,7 @@
 </p:sld>
 </file>
 
-<file path=ppt/slides/slide2.xml><?xml version="1.0" encoding="utf-8"?>
-<p:sld xmlns:a="http://schemas.openxmlformats.org/drawingml/2006/main" xmlns:r="http://schemas.openxmlformats.org/officeDocument/2006/relationships" xmlns:p="http://schemas.openxmlformats.org/presentationml/2006/main">
-  <p:cSld>
-    <p:spTree>
-      <p:nvGrpSpPr>
-        <p:cNvPr id="1" name=""/>
-        <p:cNvGrpSpPr/>
-        <p:nvPr/>
-      </p:nvGrpSpPr>
-      <p:grpSpPr>
-        <a:xfrm>
-          <a:off x="0" y="0"/>
-          <a:ext cx="0" cy="0"/>
-          <a:chOff x="0" y="0"/>
-          <a:chExt cx="0" cy="0"/>
-        </a:xfrm>
-      </p:grpSpPr>
-      <p:sp>
-        <p:nvSpPr>
-          <p:cNvPr id="2" name="Title 1">
-            <a:extLst>
-              <a:ext uri="{FF2B5EF4-FFF2-40B4-BE49-F238E27FC236}">
-                <a16:creationId xmlns:a16="http://schemas.microsoft.com/office/drawing/2014/main" id="{870C1474-CEC1-855A-A711-24F4368160B9}"/>
-              </a:ext>
-            </a:extLst>
-          </p:cNvPr>
-          <p:cNvSpPr>
-            <a:spLocks noGrp="1"/>
-          </p:cNvSpPr>
-          <p:nvPr>
-            <p:ph type="title"/>
-          </p:nvPr>
-        </p:nvSpPr>
-        <p:spPr/>
-        <p:txBody>
-          <a:bodyPr/>
-          <a:lstStyle/>
-          <a:p>
-            <a:r>
-              <a:rPr lang="en-US" dirty="0"/>
-              <a:t>schedule</a:t>
-            </a:r>
-          </a:p>
-        </p:txBody>
-      </p:sp>
-      <p:sp>
-        <p:nvSpPr>
-          <p:cNvPr id="3" name="Content Placeholder 2">
-            <a:extLst>
-              <a:ext uri="{FF2B5EF4-FFF2-40B4-BE49-F238E27FC236}">
-                <a16:creationId xmlns:a16="http://schemas.microsoft.com/office/drawing/2014/main" id="{18A99213-C03D-FE03-44ED-C56E6416DECF}"/>
-              </a:ext>
-            </a:extLst>
-          </p:cNvPr>
-          <p:cNvSpPr>
-            <a:spLocks noGrp="1"/>
-          </p:cNvSpPr>
-          <p:nvPr>
-            <p:ph idx="1"/>
-          </p:nvPr>
-        </p:nvSpPr>
-        <p:spPr/>
-        <p:txBody>
-          <a:bodyPr/>
-          <a:lstStyle/>
-          <a:p>
-            <a:pPr marL="457200" indent="-457200">
-              <a:buFont typeface="+mj-lt"/>
-              <a:buAutoNum type="arabicPeriod"/>
-            </a:pPr>
-            <a:r>
-              <a:rPr lang="en-US" dirty="0"/>
-              <a:t>Basic Definitions</a:t>
-            </a:r>
-          </a:p>
-          <a:p>
-            <a:pPr lvl="1"/>
-            <a:r>
-              <a:rPr lang="en-US" dirty="0"/>
-              <a:t>Population (Parameter) vs. Sample (Statistics)</a:t>
-            </a:r>
-          </a:p>
-          <a:p>
-            <a:pPr marL="457200" indent="-457200">
-              <a:buFont typeface="+mj-lt"/>
-              <a:buAutoNum type="arabicPeriod"/>
-            </a:pPr>
-            <a:r>
-              <a:rPr lang="en-US" dirty="0"/>
-              <a:t>Hypothesis Testing for a Single Mean</a:t>
-            </a:r>
-          </a:p>
-          <a:p>
-            <a:pPr lvl="1"/>
-            <a:r>
-              <a:rPr lang="en-US" dirty="0"/>
-              <a:t>Setting up hypothesis</a:t>
-            </a:r>
-          </a:p>
-          <a:p>
-            <a:pPr lvl="1"/>
-            <a:r>
-              <a:rPr lang="en-US" dirty="0"/>
-              <a:t>Conditions</a:t>
-            </a:r>
-          </a:p>
-          <a:p>
-            <a:pPr lvl="1"/>
-            <a:r>
-              <a:rPr lang="en-US" dirty="0"/>
-              <a:t>Finding Standardized Statistics and Drawing Conclusion</a:t>
-            </a:r>
-          </a:p>
-          <a:p>
-            <a:pPr lvl="1"/>
-            <a:endParaRPr lang="en-US" dirty="0"/>
-          </a:p>
-        </p:txBody>
-      </p:sp>
-    </p:spTree>
-    <p:extLst>
-      <p:ext uri="{BB962C8B-B14F-4D97-AF65-F5344CB8AC3E}">
-        <p14:creationId xmlns:p14="http://schemas.microsoft.com/office/powerpoint/2010/main" val="3554969862"/>
-      </p:ext>
-    </p:extLst>
-  </p:cSld>
-  <p:clrMapOvr>
-    <a:masterClrMapping/>
-  </p:clrMapOvr>
-</p:sld>
-</file>
-
-<file path=ppt/slides/slide20.xml><?xml version="1.0" encoding="utf-8"?>
+<file path=ppt/slides/slide21.xml><?xml version="1.0" encoding="utf-8"?>
 <p:sld xmlns:a="http://schemas.openxmlformats.org/drawingml/2006/main" xmlns:r="http://schemas.openxmlformats.org/officeDocument/2006/relationships" xmlns:p="http://schemas.openxmlformats.org/presentationml/2006/main">
   <p:cSld>
     <p:spTree>
@@ -11939,7 +12201,7 @@
 </p:sld>
 </file>
 
-<file path=ppt/slides/slide21.xml><?xml version="1.0" encoding="utf-8"?>
+<file path=ppt/slides/slide22.xml><?xml version="1.0" encoding="utf-8"?>
 <p:sld xmlns:a="http://schemas.openxmlformats.org/drawingml/2006/main" xmlns:r="http://schemas.openxmlformats.org/officeDocument/2006/relationships" xmlns:p="http://schemas.openxmlformats.org/presentationml/2006/main">
   <p:cSld>
     <p:spTree>
@@ -12106,7 +12368,7 @@
 </p:sld>
 </file>
 
-<file path=ppt/slides/slide22.xml><?xml version="1.0" encoding="utf-8"?>
+<file path=ppt/slides/slide23.xml><?xml version="1.0" encoding="utf-8"?>
 <p:sld xmlns:a="http://schemas.openxmlformats.org/drawingml/2006/main" xmlns:r="http://schemas.openxmlformats.org/officeDocument/2006/relationships" xmlns:p="http://schemas.openxmlformats.org/presentationml/2006/main">
   <p:cSld>
     <p:spTree>
@@ -12485,7 +12747,7 @@
 </p:sld>
 </file>
 
-<file path=ppt/slides/slide23.xml><?xml version="1.0" encoding="utf-8"?>
+<file path=ppt/slides/slide24.xml><?xml version="1.0" encoding="utf-8"?>
 <p:sld xmlns:a="http://schemas.openxmlformats.org/drawingml/2006/main" xmlns:r="http://schemas.openxmlformats.org/officeDocument/2006/relationships" xmlns:p="http://schemas.openxmlformats.org/presentationml/2006/main">
   <p:cSld>
     <p:spTree>
@@ -13766,7 +14028,7 @@
 </p:sld>
 </file>
 
-<file path=ppt/slides/slide24.xml><?xml version="1.0" encoding="utf-8"?>
+<file path=ppt/slides/slide25.xml><?xml version="1.0" encoding="utf-8"?>
 <p:sld xmlns:a="http://schemas.openxmlformats.org/drawingml/2006/main" xmlns:r="http://schemas.openxmlformats.org/officeDocument/2006/relationships" xmlns:p="http://schemas.openxmlformats.org/presentationml/2006/main">
   <p:cSld>
     <p:spTree>
@@ -14875,7 +15137,7 @@
 </p:sld>
 </file>
 
-<file path=ppt/slides/slide25.xml><?xml version="1.0" encoding="utf-8"?>
+<file path=ppt/slides/slide26.xml><?xml version="1.0" encoding="utf-8"?>
 <p:sld xmlns:a="http://schemas.openxmlformats.org/drawingml/2006/main" xmlns:r="http://schemas.openxmlformats.org/officeDocument/2006/relationships" xmlns:p="http://schemas.openxmlformats.org/presentationml/2006/main">
   <p:cSld>
     <p:spTree>
@@ -15141,7 +15403,7 @@
 </p:sld>
 </file>
 
-<file path=ppt/slides/slide26.xml><?xml version="1.0" encoding="utf-8"?>
+<file path=ppt/slides/slide27.xml><?xml version="1.0" encoding="utf-8"?>
 <p:sld xmlns:a="http://schemas.openxmlformats.org/drawingml/2006/main" xmlns:r="http://schemas.openxmlformats.org/officeDocument/2006/relationships" xmlns:p="http://schemas.openxmlformats.org/presentationml/2006/main">
   <p:cSld>
     <p:spTree>
@@ -15900,7 +16162,7 @@
 </p:sld>
 </file>
 
-<file path=ppt/slides/slide27.xml><?xml version="1.0" encoding="utf-8"?>
+<file path=ppt/slides/slide28.xml><?xml version="1.0" encoding="utf-8"?>
 <p:sld xmlns:a="http://schemas.openxmlformats.org/drawingml/2006/main" xmlns:r="http://schemas.openxmlformats.org/officeDocument/2006/relationships" xmlns:p="http://schemas.openxmlformats.org/presentationml/2006/main">
   <p:cSld>
     <p:spTree>
@@ -16200,7 +16462,7 @@
 </p:sld>
 </file>
 
-<file path=ppt/slides/slide28.xml><?xml version="1.0" encoding="utf-8"?>
+<file path=ppt/slides/slide29.xml><?xml version="1.0" encoding="utf-8"?>
 <p:sld xmlns:a="http://schemas.openxmlformats.org/drawingml/2006/main" xmlns:r="http://schemas.openxmlformats.org/officeDocument/2006/relationships" xmlns:p="http://schemas.openxmlformats.org/presentationml/2006/main">
   <p:cSld>
     <p:spTree>
@@ -16387,7 +16649,214 @@
 </p:sld>
 </file>
 
-<file path=ppt/slides/slide29.xml><?xml version="1.0" encoding="utf-8"?>
+<file path=ppt/slides/slide3.xml><?xml version="1.0" encoding="utf-8"?>
+<p:sld xmlns:a="http://schemas.openxmlformats.org/drawingml/2006/main" xmlns:r="http://schemas.openxmlformats.org/officeDocument/2006/relationships" xmlns:p="http://schemas.openxmlformats.org/presentationml/2006/main">
+  <p:cSld>
+    <p:bg>
+      <p:bgPr>
+        <a:solidFill>
+          <a:schemeClr val="bg1"/>
+        </a:solidFill>
+        <a:effectLst/>
+      </p:bgPr>
+    </p:bg>
+    <p:spTree>
+      <p:nvGrpSpPr>
+        <p:cNvPr id="1" name=""/>
+        <p:cNvGrpSpPr/>
+        <p:nvPr/>
+      </p:nvGrpSpPr>
+      <p:grpSpPr>
+        <a:xfrm>
+          <a:off x="0" y="0"/>
+          <a:ext cx="0" cy="0"/>
+          <a:chOff x="0" y="0"/>
+          <a:chExt cx="0" cy="0"/>
+        </a:xfrm>
+      </p:grpSpPr>
+      <p:sp>
+        <p:nvSpPr>
+          <p:cNvPr id="10" name="Rectangle 9">
+            <a:extLst>
+              <a:ext uri="{FF2B5EF4-FFF2-40B4-BE49-F238E27FC236}">
+                <a16:creationId xmlns:a16="http://schemas.microsoft.com/office/drawing/2014/main" id="{48FDEBDB-5859-4B9E-8810-2C5CFED093F3}"/>
+              </a:ext>
+              <a:ext uri="{C183D7F6-B498-43B3-948B-1728B52AA6E4}">
+                <adec:decorative xmlns:adec="http://schemas.microsoft.com/office/drawing/2017/decorative" val="1"/>
+              </a:ext>
+            </a:extLst>
+          </p:cNvPr>
+          <p:cNvSpPr>
+            <a:spLocks noGrp="1" noRot="1" noChangeAspect="1" noMove="1" noResize="1" noEditPoints="1" noAdjustHandles="1" noChangeArrowheads="1" noChangeShapeType="1" noTextEdit="1"/>
+          </p:cNvSpPr>
+          <p:nvPr>
+            <p:extLst>
+              <p:ext uri="{386F3935-93C4-4BCD-93E2-E3B085C9AB24}">
+                <p16:designElem xmlns:p16="http://schemas.microsoft.com/office/powerpoint/2015/main" val="1"/>
+              </p:ext>
+            </p:extLst>
+          </p:nvPr>
+        </p:nvSpPr>
+        <p:spPr>
+          <a:xfrm>
+            <a:off x="0" y="0"/>
+            <a:ext cx="12188952" cy="6858000"/>
+          </a:xfrm>
+          <a:prstGeom prst="rect">
+            <a:avLst/>
+          </a:prstGeom>
+          <a:solidFill>
+            <a:schemeClr val="accent1"/>
+          </a:solidFill>
+          <a:ln>
+            <a:noFill/>
+          </a:ln>
+        </p:spPr>
+        <p:style>
+          <a:lnRef idx="2">
+            <a:schemeClr val="accent1">
+              <a:shade val="50000"/>
+            </a:schemeClr>
+          </a:lnRef>
+          <a:fillRef idx="1">
+            <a:schemeClr val="accent1"/>
+          </a:fillRef>
+          <a:effectRef idx="0">
+            <a:schemeClr val="accent1"/>
+          </a:effectRef>
+          <a:fontRef idx="minor">
+            <a:schemeClr val="lt1"/>
+          </a:fontRef>
+        </p:style>
+        <p:txBody>
+          <a:bodyPr rtlCol="0" anchor="ctr"/>
+          <a:lstStyle/>
+          <a:p>
+            <a:pPr algn="ctr"/>
+            <a:endParaRPr lang="en-US"/>
+          </a:p>
+        </p:txBody>
+      </p:sp>
+      <p:sp>
+        <p:nvSpPr>
+          <p:cNvPr id="4" name="Title 3">
+            <a:extLst>
+              <a:ext uri="{FF2B5EF4-FFF2-40B4-BE49-F238E27FC236}">
+                <a16:creationId xmlns:a16="http://schemas.microsoft.com/office/drawing/2014/main" id="{3921E7A2-126A-DC08-9062-B79CCCE5D77C}"/>
+              </a:ext>
+            </a:extLst>
+          </p:cNvPr>
+          <p:cNvSpPr>
+            <a:spLocks noGrp="1"/>
+          </p:cNvSpPr>
+          <p:nvPr>
+            <p:ph type="ctrTitle"/>
+          </p:nvPr>
+        </p:nvSpPr>
+        <p:spPr>
+          <a:xfrm>
+            <a:off x="1051560" y="942975"/>
+            <a:ext cx="9966960" cy="3525056"/>
+          </a:xfrm>
+        </p:spPr>
+        <p:txBody>
+          <a:bodyPr anchor="b">
+            <a:normAutofit/>
+          </a:bodyPr>
+          <a:lstStyle/>
+          <a:p>
+            <a:pPr algn="ctr"/>
+            <a:r>
+              <a:rPr lang="en-US" sz="8200" dirty="0">
+                <a:solidFill>
+                  <a:srgbClr val="FFFFFF"/>
+                </a:solidFill>
+              </a:rPr>
+              <a:t>Population (Parameter) vs. Sample (Statistics)</a:t>
+            </a:r>
+            <a:br>
+              <a:rPr lang="en-US" sz="8200" dirty="0">
+                <a:solidFill>
+                  <a:srgbClr val="FFFFFF"/>
+                </a:solidFill>
+              </a:rPr>
+            </a:br>
+            <a:endParaRPr lang="en-US" sz="8200" dirty="0">
+              <a:solidFill>
+                <a:srgbClr val="FFFFFF"/>
+              </a:solidFill>
+            </a:endParaRPr>
+          </a:p>
+        </p:txBody>
+      </p:sp>
+      <p:cxnSp>
+        <p:nvCxnSpPr>
+          <p:cNvPr id="12" name="Straight Connector 11">
+            <a:extLst>
+              <a:ext uri="{FF2B5EF4-FFF2-40B4-BE49-F238E27FC236}">
+                <a16:creationId xmlns:a16="http://schemas.microsoft.com/office/drawing/2014/main" id="{B1D1A340-723B-4014-B5FE-204F06273136}"/>
+              </a:ext>
+              <a:ext uri="{C183D7F6-B498-43B3-948B-1728B52AA6E4}">
+                <adec:decorative xmlns:adec="http://schemas.microsoft.com/office/drawing/2017/decorative" val="1"/>
+              </a:ext>
+            </a:extLst>
+          </p:cNvPr>
+          <p:cNvCxnSpPr>
+            <a:cxnSpLocks noGrp="1" noRot="1" noChangeAspect="1" noMove="1" noResize="1" noEditPoints="1" noAdjustHandles="1" noChangeArrowheads="1" noChangeShapeType="1"/>
+          </p:cNvCxnSpPr>
+          <p:nvPr>
+            <p:extLst>
+              <p:ext uri="{386F3935-93C4-4BCD-93E2-E3B085C9AB24}">
+                <p16:designElem xmlns:p16="http://schemas.microsoft.com/office/powerpoint/2015/main" val="1"/>
+              </p:ext>
+            </p:extLst>
+          </p:nvPr>
+        </p:nvCxnSpPr>
+        <p:spPr>
+          <a:xfrm>
+            <a:off x="1524000" y="4558589"/>
+            <a:ext cx="9144000" cy="0"/>
+          </a:xfrm>
+          <a:prstGeom prst="line">
+            <a:avLst/>
+          </a:prstGeom>
+          <a:ln w="28575">
+            <a:solidFill>
+              <a:srgbClr val="FFFFFF">
+                <a:alpha val="50000"/>
+              </a:srgbClr>
+            </a:solidFill>
+          </a:ln>
+        </p:spPr>
+        <p:style>
+          <a:lnRef idx="1">
+            <a:schemeClr val="accent1"/>
+          </a:lnRef>
+          <a:fillRef idx="0">
+            <a:schemeClr val="accent1"/>
+          </a:fillRef>
+          <a:effectRef idx="0">
+            <a:schemeClr val="accent1"/>
+          </a:effectRef>
+          <a:fontRef idx="minor">
+            <a:schemeClr val="tx1"/>
+          </a:fontRef>
+        </p:style>
+      </p:cxnSp>
+    </p:spTree>
+    <p:extLst>
+      <p:ext uri="{BB962C8B-B14F-4D97-AF65-F5344CB8AC3E}">
+        <p14:creationId xmlns:p14="http://schemas.microsoft.com/office/powerpoint/2010/main" val="2231280000"/>
+      </p:ext>
+    </p:extLst>
+  </p:cSld>
+  <p:clrMapOvr>
+    <a:masterClrMapping/>
+  </p:clrMapOvr>
+</p:sld>
+</file>
+
+<file path=ppt/slides/slide30.xml><?xml version="1.0" encoding="utf-8"?>
 <p:sld xmlns:a="http://schemas.openxmlformats.org/drawingml/2006/main" xmlns:r="http://schemas.openxmlformats.org/officeDocument/2006/relationships" xmlns:p="http://schemas.openxmlformats.org/presentationml/2006/main">
   <p:cSld>
     <p:spTree>
@@ -16782,214 +17251,7 @@
 </p:sld>
 </file>
 
-<file path=ppt/slides/slide3.xml><?xml version="1.0" encoding="utf-8"?>
-<p:sld xmlns:a="http://schemas.openxmlformats.org/drawingml/2006/main" xmlns:r="http://schemas.openxmlformats.org/officeDocument/2006/relationships" xmlns:p="http://schemas.openxmlformats.org/presentationml/2006/main">
-  <p:cSld>
-    <p:bg>
-      <p:bgPr>
-        <a:solidFill>
-          <a:schemeClr val="bg1"/>
-        </a:solidFill>
-        <a:effectLst/>
-      </p:bgPr>
-    </p:bg>
-    <p:spTree>
-      <p:nvGrpSpPr>
-        <p:cNvPr id="1" name=""/>
-        <p:cNvGrpSpPr/>
-        <p:nvPr/>
-      </p:nvGrpSpPr>
-      <p:grpSpPr>
-        <a:xfrm>
-          <a:off x="0" y="0"/>
-          <a:ext cx="0" cy="0"/>
-          <a:chOff x="0" y="0"/>
-          <a:chExt cx="0" cy="0"/>
-        </a:xfrm>
-      </p:grpSpPr>
-      <p:sp>
-        <p:nvSpPr>
-          <p:cNvPr id="10" name="Rectangle 9">
-            <a:extLst>
-              <a:ext uri="{FF2B5EF4-FFF2-40B4-BE49-F238E27FC236}">
-                <a16:creationId xmlns:a16="http://schemas.microsoft.com/office/drawing/2014/main" id="{48FDEBDB-5859-4B9E-8810-2C5CFED093F3}"/>
-              </a:ext>
-              <a:ext uri="{C183D7F6-B498-43B3-948B-1728B52AA6E4}">
-                <adec:decorative xmlns:adec="http://schemas.microsoft.com/office/drawing/2017/decorative" val="1"/>
-              </a:ext>
-            </a:extLst>
-          </p:cNvPr>
-          <p:cNvSpPr>
-            <a:spLocks noGrp="1" noRot="1" noChangeAspect="1" noMove="1" noResize="1" noEditPoints="1" noAdjustHandles="1" noChangeArrowheads="1" noChangeShapeType="1" noTextEdit="1"/>
-          </p:cNvSpPr>
-          <p:nvPr>
-            <p:extLst>
-              <p:ext uri="{386F3935-93C4-4BCD-93E2-E3B085C9AB24}">
-                <p16:designElem xmlns:p16="http://schemas.microsoft.com/office/powerpoint/2015/main" val="1"/>
-              </p:ext>
-            </p:extLst>
-          </p:nvPr>
-        </p:nvSpPr>
-        <p:spPr>
-          <a:xfrm>
-            <a:off x="0" y="0"/>
-            <a:ext cx="12188952" cy="6858000"/>
-          </a:xfrm>
-          <a:prstGeom prst="rect">
-            <a:avLst/>
-          </a:prstGeom>
-          <a:solidFill>
-            <a:schemeClr val="accent1"/>
-          </a:solidFill>
-          <a:ln>
-            <a:noFill/>
-          </a:ln>
-        </p:spPr>
-        <p:style>
-          <a:lnRef idx="2">
-            <a:schemeClr val="accent1">
-              <a:shade val="50000"/>
-            </a:schemeClr>
-          </a:lnRef>
-          <a:fillRef idx="1">
-            <a:schemeClr val="accent1"/>
-          </a:fillRef>
-          <a:effectRef idx="0">
-            <a:schemeClr val="accent1"/>
-          </a:effectRef>
-          <a:fontRef idx="minor">
-            <a:schemeClr val="lt1"/>
-          </a:fontRef>
-        </p:style>
-        <p:txBody>
-          <a:bodyPr rtlCol="0" anchor="ctr"/>
-          <a:lstStyle/>
-          <a:p>
-            <a:pPr algn="ctr"/>
-            <a:endParaRPr lang="en-US"/>
-          </a:p>
-        </p:txBody>
-      </p:sp>
-      <p:sp>
-        <p:nvSpPr>
-          <p:cNvPr id="4" name="Title 3">
-            <a:extLst>
-              <a:ext uri="{FF2B5EF4-FFF2-40B4-BE49-F238E27FC236}">
-                <a16:creationId xmlns:a16="http://schemas.microsoft.com/office/drawing/2014/main" id="{3921E7A2-126A-DC08-9062-B79CCCE5D77C}"/>
-              </a:ext>
-            </a:extLst>
-          </p:cNvPr>
-          <p:cNvSpPr>
-            <a:spLocks noGrp="1"/>
-          </p:cNvSpPr>
-          <p:nvPr>
-            <p:ph type="ctrTitle"/>
-          </p:nvPr>
-        </p:nvSpPr>
-        <p:spPr>
-          <a:xfrm>
-            <a:off x="1051560" y="942975"/>
-            <a:ext cx="9966960" cy="3525056"/>
-          </a:xfrm>
-        </p:spPr>
-        <p:txBody>
-          <a:bodyPr anchor="b">
-            <a:normAutofit/>
-          </a:bodyPr>
-          <a:lstStyle/>
-          <a:p>
-            <a:pPr algn="ctr"/>
-            <a:r>
-              <a:rPr lang="en-US" sz="8200" dirty="0">
-                <a:solidFill>
-                  <a:srgbClr val="FFFFFF"/>
-                </a:solidFill>
-              </a:rPr>
-              <a:t>Population (Parameter) vs. Sample (Statistics)</a:t>
-            </a:r>
-            <a:br>
-              <a:rPr lang="en-US" sz="8200" dirty="0">
-                <a:solidFill>
-                  <a:srgbClr val="FFFFFF"/>
-                </a:solidFill>
-              </a:rPr>
-            </a:br>
-            <a:endParaRPr lang="en-US" sz="8200" dirty="0">
-              <a:solidFill>
-                <a:srgbClr val="FFFFFF"/>
-              </a:solidFill>
-            </a:endParaRPr>
-          </a:p>
-        </p:txBody>
-      </p:sp>
-      <p:cxnSp>
-        <p:nvCxnSpPr>
-          <p:cNvPr id="12" name="Straight Connector 11">
-            <a:extLst>
-              <a:ext uri="{FF2B5EF4-FFF2-40B4-BE49-F238E27FC236}">
-                <a16:creationId xmlns:a16="http://schemas.microsoft.com/office/drawing/2014/main" id="{B1D1A340-723B-4014-B5FE-204F06273136}"/>
-              </a:ext>
-              <a:ext uri="{C183D7F6-B498-43B3-948B-1728B52AA6E4}">
-                <adec:decorative xmlns:adec="http://schemas.microsoft.com/office/drawing/2017/decorative" val="1"/>
-              </a:ext>
-            </a:extLst>
-          </p:cNvPr>
-          <p:cNvCxnSpPr>
-            <a:cxnSpLocks noGrp="1" noRot="1" noChangeAspect="1" noMove="1" noResize="1" noEditPoints="1" noAdjustHandles="1" noChangeArrowheads="1" noChangeShapeType="1"/>
-          </p:cNvCxnSpPr>
-          <p:nvPr>
-            <p:extLst>
-              <p:ext uri="{386F3935-93C4-4BCD-93E2-E3B085C9AB24}">
-                <p16:designElem xmlns:p16="http://schemas.microsoft.com/office/powerpoint/2015/main" val="1"/>
-              </p:ext>
-            </p:extLst>
-          </p:nvPr>
-        </p:nvCxnSpPr>
-        <p:spPr>
-          <a:xfrm>
-            <a:off x="1524000" y="4558589"/>
-            <a:ext cx="9144000" cy="0"/>
-          </a:xfrm>
-          <a:prstGeom prst="line">
-            <a:avLst/>
-          </a:prstGeom>
-          <a:ln w="28575">
-            <a:solidFill>
-              <a:srgbClr val="FFFFFF">
-                <a:alpha val="50000"/>
-              </a:srgbClr>
-            </a:solidFill>
-          </a:ln>
-        </p:spPr>
-        <p:style>
-          <a:lnRef idx="1">
-            <a:schemeClr val="accent1"/>
-          </a:lnRef>
-          <a:fillRef idx="0">
-            <a:schemeClr val="accent1"/>
-          </a:fillRef>
-          <a:effectRef idx="0">
-            <a:schemeClr val="accent1"/>
-          </a:effectRef>
-          <a:fontRef idx="minor">
-            <a:schemeClr val="tx1"/>
-          </a:fontRef>
-        </p:style>
-      </p:cxnSp>
-    </p:spTree>
-    <p:extLst>
-      <p:ext uri="{BB962C8B-B14F-4D97-AF65-F5344CB8AC3E}">
-        <p14:creationId xmlns:p14="http://schemas.microsoft.com/office/powerpoint/2010/main" val="2231280000"/>
-      </p:ext>
-    </p:extLst>
-  </p:cSld>
-  <p:clrMapOvr>
-    <a:masterClrMapping/>
-  </p:clrMapOvr>
-</p:sld>
-</file>
-
-<file path=ppt/slides/slide30.xml><?xml version="1.0" encoding="utf-8"?>
+<file path=ppt/slides/slide31.xml><?xml version="1.0" encoding="utf-8"?>
 <p:sld xmlns:a="http://schemas.openxmlformats.org/drawingml/2006/main" xmlns:r="http://schemas.openxmlformats.org/officeDocument/2006/relationships" xmlns:p="http://schemas.openxmlformats.org/presentationml/2006/main">
   <p:cSld>
     <p:spTree>
@@ -17775,7 +18037,7 @@
         </p:spPr>
         <p:txBody>
           <a:bodyPr>
-            <a:normAutofit fontScale="77500" lnSpcReduction="20000"/>
+            <a:normAutofit fontScale="92500" lnSpcReduction="20000"/>
           </a:bodyPr>
           <a:lstStyle/>
           <a:p>
@@ -17995,25 +18257,6 @@
             <a:r>
               <a:rPr lang="en-US" sz="2600" dirty="0"/>
               <a:t>the long-run numerical property of the process.</a:t>
-            </a:r>
-          </a:p>
-          <a:p>
-            <a:pPr lvl="1">
-              <a:lnSpc>
-                <a:spcPct val="150000"/>
-              </a:lnSpc>
-            </a:pPr>
-            <a:r>
-              <a:rPr lang="en-US" sz="2200" dirty="0">
-                <a:sym typeface="Wingdings"/>
-              </a:rPr>
-              <a:t>“The long run average</a:t>
-            </a:r>
-            <a:r>
-              <a:rPr lang="en-US" sz="2200" i="1" dirty="0">
-                <a:sym typeface="Wingdings"/>
-              </a:rPr>
-              <a:t>…context”</a:t>
             </a:r>
           </a:p>
           <a:p>
@@ -18515,21 +18758,14 @@
             <p:ph type="title"/>
           </p:nvPr>
         </p:nvSpPr>
-        <p:spPr>
-          <a:xfrm>
-            <a:off x="1069848" y="355323"/>
-            <a:ext cx="10058400" cy="983950"/>
-          </a:xfrm>
-        </p:spPr>
+        <p:spPr/>
         <p:txBody>
-          <a:bodyPr>
-            <a:normAutofit/>
-          </a:bodyPr>
+          <a:bodyPr/>
           <a:lstStyle/>
           <a:p>
             <a:r>
-              <a:rPr lang="en-US" sz="4800" dirty="0"/>
-              <a:t>Statistical Significance</a:t>
+              <a:rPr lang="en-US" dirty="0"/>
+              <a:t>Vocabulary – Quantitative data</a:t>
             </a:r>
           </a:p>
         </p:txBody>
@@ -18546,110 +18782,174 @@
         </p:nvSpPr>
         <p:spPr>
           <a:xfrm>
-            <a:off x="1069848" y="1505528"/>
-            <a:ext cx="10058400" cy="5054600"/>
+            <a:off x="443883" y="2121408"/>
+            <a:ext cx="10684365" cy="4050792"/>
           </a:xfrm>
         </p:spPr>
         <p:txBody>
-          <a:bodyPr>
-            <a:normAutofit/>
-          </a:bodyPr>
+          <a:bodyPr/>
           <a:lstStyle/>
           <a:p>
             <a:r>
-              <a:rPr lang="en-US" b="1" dirty="0">
-                <a:solidFill>
-                  <a:schemeClr val="accent1">
-                    <a:lumMod val="75000"/>
-                  </a:schemeClr>
-                </a:solidFill>
-              </a:rPr>
-              <a:t>Statistics</a:t>
-            </a:r>
-            <a:r>
               <a:rPr lang="en-US" dirty="0"/>
-              <a:t> – Estimate broad populations</a:t>
-            </a:r>
-          </a:p>
-          <a:p>
-            <a:pPr lvl="1"/>
+              <a:t>Summary Statistics</a:t>
+            </a:r>
+          </a:p>
+          <a:p>
+            <a:pPr>
+              <a:lnSpc>
+                <a:spcPct val="150000"/>
+              </a:lnSpc>
+              <a:spcBef>
+                <a:spcPts val="0"/>
+              </a:spcBef>
+            </a:pPr>
             <a:r>
               <a:rPr lang="en-US" dirty="0"/>
-              <a:t>No way to collect all information</a:t>
-            </a:r>
-          </a:p>
-          <a:p>
-            <a:pPr lvl="1"/>
+              <a:t>Mean:</a:t>
+            </a:r>
+          </a:p>
+          <a:p>
+            <a:pPr lvl="1">
+              <a:lnSpc>
+                <a:spcPct val="150000"/>
+              </a:lnSpc>
+              <a:spcBef>
+                <a:spcPts val="0"/>
+              </a:spcBef>
+            </a:pPr>
             <a:r>
               <a:rPr lang="en-US" dirty="0"/>
-              <a:t>Want to know when is a sample Statistically Significant?</a:t>
-            </a:r>
+              <a:t>Add up all the values first, then divide by the total number of values.</a:t>
+            </a:r>
+          </a:p>
+          <a:p>
+            <a:pPr>
+              <a:lnSpc>
+                <a:spcPct val="150000"/>
+              </a:lnSpc>
+              <a:spcBef>
+                <a:spcPts val="0"/>
+              </a:spcBef>
+            </a:pPr>
+            <a:r>
+              <a:rPr lang="en-US" dirty="0"/>
+              <a:t>Median:</a:t>
+            </a:r>
+          </a:p>
+          <a:p>
+            <a:pPr lvl="1">
+              <a:lnSpc>
+                <a:spcPct val="150000"/>
+              </a:lnSpc>
+              <a:spcBef>
+                <a:spcPts val="0"/>
+              </a:spcBef>
+              <a:spcAft>
+                <a:spcPts val="0"/>
+              </a:spcAft>
+            </a:pPr>
+            <a:r>
+              <a:rPr lang="en-US" dirty="0"/>
+              <a:t>Half of the data is above, half is below.</a:t>
+            </a:r>
+          </a:p>
+          <a:p>
+            <a:pPr lvl="1">
+              <a:lnSpc>
+                <a:spcPct val="150000"/>
+              </a:lnSpc>
+              <a:spcBef>
+                <a:spcPts val="0"/>
+              </a:spcBef>
+              <a:spcAft>
+                <a:spcPts val="0"/>
+              </a:spcAft>
+            </a:pPr>
+            <a:r>
+              <a:rPr lang="en-US" dirty="0"/>
+              <a:t>“Middle” value when data is ordered.</a:t>
+            </a:r>
+          </a:p>
+          <a:p>
+            <a:pPr>
+              <a:lnSpc>
+                <a:spcPct val="150000"/>
+              </a:lnSpc>
+              <a:spcBef>
+                <a:spcPts val="0"/>
+              </a:spcBef>
+            </a:pPr>
+            <a:r>
+              <a:rPr lang="en-US" dirty="0"/>
+              <a:t>Outliers: unusual data points.</a:t>
+            </a:r>
+          </a:p>
+          <a:p>
+            <a:pPr>
+              <a:lnSpc>
+                <a:spcPct val="150000"/>
+              </a:lnSpc>
+              <a:spcBef>
+                <a:spcPts val="0"/>
+              </a:spcBef>
+            </a:pPr>
+            <a:endParaRPr lang="en-US" dirty="0"/>
           </a:p>
           <a:p>
             <a:pPr marL="0" indent="0">
+              <a:lnSpc>
+                <a:spcPct val="150000"/>
+              </a:lnSpc>
+              <a:spcBef>
+                <a:spcPts val="0"/>
+              </a:spcBef>
               <a:buNone/>
             </a:pPr>
-            <a:endParaRPr lang="en-US" b="1" dirty="0">
-              <a:solidFill>
-                <a:srgbClr val="7030A0"/>
-              </a:solidFill>
-            </a:endParaRPr>
-          </a:p>
-          <a:p>
-            <a:pPr marL="0" indent="0">
-              <a:buNone/>
-            </a:pPr>
-            <a:r>
-              <a:rPr lang="en-US" b="1" dirty="0">
-                <a:solidFill>
-                  <a:schemeClr val="accent1">
-                    <a:lumMod val="75000"/>
-                  </a:schemeClr>
-                </a:solidFill>
-              </a:rPr>
-              <a:t>So What is Statistical Significance?</a:t>
-            </a:r>
-          </a:p>
-          <a:p>
-            <a:pPr lvl="1"/>
             <a:r>
               <a:rPr lang="en-US" dirty="0"/>
-              <a:t>Asking ourselves: “Is our result unlikely to have occurred by </a:t>
-            </a:r>
-            <a:r>
-              <a:rPr lang="en-US" i="1" dirty="0"/>
-              <a:t>random chance?”</a:t>
-            </a:r>
-          </a:p>
-          <a:p>
-            <a:pPr lvl="1"/>
+              <a:t>Our Parameter is going to focus on the mean</a:t>
+            </a:r>
+          </a:p>
+          <a:p>
             <a:endParaRPr lang="en-US" dirty="0"/>
-          </a:p>
-          <a:p>
-            <a:pPr marL="0" indent="0">
-              <a:buNone/>
-            </a:pPr>
-            <a:r>
-              <a:rPr lang="en-US" dirty="0"/>
-              <a:t>How do we determine this? </a:t>
-            </a:r>
-            <a:r>
-              <a:rPr lang="en-US" dirty="0">
-                <a:solidFill>
-                  <a:schemeClr val="accent1">
-                    <a:lumMod val="75000"/>
-                  </a:schemeClr>
-                </a:solidFill>
-              </a:rPr>
-              <a:t>Hypothesis Testing</a:t>
-            </a:r>
           </a:p>
         </p:txBody>
       </p:sp>
+      <p:pic>
+        <p:nvPicPr>
+          <p:cNvPr id="5" name="Picture 4">
+            <a:extLst>
+              <a:ext uri="{FF2B5EF4-FFF2-40B4-BE49-F238E27FC236}">
+                <a16:creationId xmlns:a16="http://schemas.microsoft.com/office/drawing/2014/main" id="{3D7EB1CF-CDFC-624D-B17B-7E1B0057551C}"/>
+              </a:ext>
+            </a:extLst>
+          </p:cNvPr>
+          <p:cNvPicPr>
+            <a:picLocks noChangeAspect="1"/>
+          </p:cNvPicPr>
+          <p:nvPr/>
+        </p:nvPicPr>
+        <p:blipFill>
+          <a:blip r:embed="rId2"/>
+          <a:stretch>
+            <a:fillRect/>
+          </a:stretch>
+        </p:blipFill>
+        <p:spPr>
+          <a:xfrm>
+            <a:off x="7123289" y="3329516"/>
+            <a:ext cx="3917950" cy="2604671"/>
+          </a:xfrm>
+          <a:prstGeom prst="rect">
+            <a:avLst/>
+          </a:prstGeom>
+        </p:spPr>
+      </p:pic>
     </p:spTree>
     <p:extLst>
       <p:ext uri="{BB962C8B-B14F-4D97-AF65-F5344CB8AC3E}">
-        <p14:creationId xmlns:p14="http://schemas.microsoft.com/office/powerpoint/2010/main" val="1989967379"/>
+        <p14:creationId xmlns:p14="http://schemas.microsoft.com/office/powerpoint/2010/main" val="118155561"/>
       </p:ext>
     </p:extLst>
   </p:cSld>
@@ -18764,7 +19064,7 @@
                   </a:schemeClr>
                 </a:solidFill>
               </a:rPr>
-              <a:t>The long run average price of an avocado in 2017.</a:t>
+              <a:t>The (long run) average price of an avocado in 2017.</a:t>
             </a:r>
           </a:p>
           <a:p>

</xml_diff>